<commit_message>
updated python current version in slides
</commit_message>
<xml_diff>
--- a/slides/Introductory_slides_first_steps_with_python.pptx
+++ b/slides/Introductory_slides_first_steps_with_python.pptx
@@ -6730,7 +6730,7 @@
         <p:spPr>
           <a:xfrm>
             <a:off x="7500960" y="5405040"/>
-            <a:ext cx="1484640" cy="230400"/>
+            <a:ext cx="1484280" cy="230040"/>
           </a:xfrm>
           <a:prstGeom prst="rect">
             <a:avLst/>
@@ -6797,49 +6797,151 @@
               <a:rPr b="0" lang="en-US" sz="4400" spc="-1" strike="noStrike">
                 <a:latin typeface="Arial"/>
               </a:rPr>
-              <a:t>Clic</a:t>
+              <a:t>C</a:t>
             </a:r>
             <a:r>
               <a:rPr b="0" lang="en-US" sz="4400" spc="-1" strike="noStrike">
                 <a:latin typeface="Arial"/>
               </a:rPr>
-              <a:t>k to </a:t>
+              <a:t>li</a:t>
             </a:r>
             <a:r>
               <a:rPr b="0" lang="en-US" sz="4400" spc="-1" strike="noStrike">
                 <a:latin typeface="Arial"/>
               </a:rPr>
-              <a:t>edit </a:t>
+              <a:t>c</a:t>
             </a:r>
             <a:r>
               <a:rPr b="0" lang="en-US" sz="4400" spc="-1" strike="noStrike">
                 <a:latin typeface="Arial"/>
               </a:rPr>
-              <a:t>the </a:t>
+              <a:t>k </a:t>
             </a:r>
             <a:r>
               <a:rPr b="0" lang="en-US" sz="4400" spc="-1" strike="noStrike">
                 <a:latin typeface="Arial"/>
               </a:rPr>
-              <a:t>title </a:t>
+              <a:t>t</a:t>
             </a:r>
             <a:r>
               <a:rPr b="0" lang="en-US" sz="4400" spc="-1" strike="noStrike">
                 <a:latin typeface="Arial"/>
               </a:rPr>
-              <a:t>text </a:t>
+              <a:t>o </a:t>
             </a:r>
             <a:r>
               <a:rPr b="0" lang="en-US" sz="4400" spc="-1" strike="noStrike">
                 <a:latin typeface="Arial"/>
               </a:rPr>
-              <a:t>form</a:t>
+              <a:t>e</a:t>
             </a:r>
             <a:r>
               <a:rPr b="0" lang="en-US" sz="4400" spc="-1" strike="noStrike">
                 <a:latin typeface="Arial"/>
               </a:rPr>
-              <a:t>at</a:t>
+              <a:t>d</a:t>
+            </a:r>
+            <a:r>
+              <a:rPr b="0" lang="en-US" sz="4400" spc="-1" strike="noStrike">
+                <a:latin typeface="Arial"/>
+              </a:rPr>
+              <a:t>it </a:t>
+            </a:r>
+            <a:r>
+              <a:rPr b="0" lang="en-US" sz="4400" spc="-1" strike="noStrike">
+                <a:latin typeface="Arial"/>
+              </a:rPr>
+              <a:t>t</a:t>
+            </a:r>
+            <a:r>
+              <a:rPr b="0" lang="en-US" sz="4400" spc="-1" strike="noStrike">
+                <a:latin typeface="Arial"/>
+              </a:rPr>
+              <a:t>h</a:t>
+            </a:r>
+            <a:r>
+              <a:rPr b="0" lang="en-US" sz="4400" spc="-1" strike="noStrike">
+                <a:latin typeface="Arial"/>
+              </a:rPr>
+              <a:t>e </a:t>
+            </a:r>
+            <a:r>
+              <a:rPr b="0" lang="en-US" sz="4400" spc="-1" strike="noStrike">
+                <a:latin typeface="Arial"/>
+              </a:rPr>
+              <a:t>ti</a:t>
+            </a:r>
+            <a:r>
+              <a:rPr b="0" lang="en-US" sz="4400" spc="-1" strike="noStrike">
+                <a:latin typeface="Arial"/>
+              </a:rPr>
+              <a:t>tl</a:t>
+            </a:r>
+            <a:r>
+              <a:rPr b="0" lang="en-US" sz="4400" spc="-1" strike="noStrike">
+                <a:latin typeface="Arial"/>
+              </a:rPr>
+              <a:t>e </a:t>
+            </a:r>
+            <a:r>
+              <a:rPr b="0" lang="en-US" sz="4400" spc="-1" strike="noStrike">
+                <a:latin typeface="Arial"/>
+              </a:rPr>
+              <a:t>t</a:t>
+            </a:r>
+            <a:r>
+              <a:rPr b="0" lang="en-US" sz="4400" spc="-1" strike="noStrike">
+                <a:latin typeface="Arial"/>
+              </a:rPr>
+              <a:t>e</a:t>
+            </a:r>
+            <a:r>
+              <a:rPr b="0" lang="en-US" sz="4400" spc="-1" strike="noStrike">
+                <a:latin typeface="Arial"/>
+              </a:rPr>
+              <a:t>x</a:t>
+            </a:r>
+            <a:r>
+              <a:rPr b="0" lang="en-US" sz="4400" spc="-1" strike="noStrike">
+                <a:latin typeface="Arial"/>
+              </a:rPr>
+              <a:t>t </a:t>
+            </a:r>
+            <a:r>
+              <a:rPr b="0" lang="en-US" sz="4400" spc="-1" strike="noStrike">
+                <a:latin typeface="Arial"/>
+              </a:rPr>
+              <a:t>f</a:t>
+            </a:r>
+            <a:r>
+              <a:rPr b="0" lang="en-US" sz="4400" spc="-1" strike="noStrike">
+                <a:latin typeface="Arial"/>
+              </a:rPr>
+              <a:t>o</a:t>
+            </a:r>
+            <a:r>
+              <a:rPr b="0" lang="en-US" sz="4400" spc="-1" strike="noStrike">
+                <a:latin typeface="Arial"/>
+              </a:rPr>
+              <a:t>r</a:t>
+            </a:r>
+            <a:r>
+              <a:rPr b="0" lang="en-US" sz="4400" spc="-1" strike="noStrike">
+                <a:latin typeface="Arial"/>
+              </a:rPr>
+              <a:t>m</a:t>
+            </a:r>
+            <a:r>
+              <a:rPr b="0" lang="en-US" sz="4400" spc="-1" strike="noStrike">
+                <a:latin typeface="Arial"/>
+              </a:rPr>
+              <a:t>a</a:t>
+            </a:r>
+            <a:r>
+              <a:rPr b="0" lang="en-US" sz="4400" spc="-1" strike="noStrike">
+                <a:latin typeface="Arial"/>
+              </a:rPr>
+              <a:t>t</a:t>
             </a:r>
             <a:endParaRPr b="0" lang="en-US" sz="4400" spc="-1" strike="noStrike">
               <a:latin typeface="Arial"/>
@@ -7477,7 +7579,7 @@
         <p:spPr>
           <a:xfrm>
             <a:off x="0" y="823680"/>
-            <a:ext cx="9142200" cy="670680"/>
+            <a:ext cx="9141840" cy="670320"/>
           </a:xfrm>
           <a:prstGeom prst="rect">
             <a:avLst/>
@@ -8403,7 +8505,7 @@
         <p:spPr>
           <a:xfrm>
             <a:off x="540000" y="5237640"/>
-            <a:ext cx="595080" cy="318240"/>
+            <a:ext cx="594720" cy="317880"/>
           </a:xfrm>
           <a:prstGeom prst="rect">
             <a:avLst/>
@@ -8495,7 +8597,7 @@
         <p:spPr>
           <a:xfrm>
             <a:off x="-8280" y="9000"/>
-            <a:ext cx="9142200" cy="2828520"/>
+            <a:ext cx="9141840" cy="2828160"/>
           </a:xfrm>
           <a:prstGeom prst="rect">
             <a:avLst/>
@@ -8518,7 +8620,7 @@
         <p:spPr>
           <a:xfrm>
             <a:off x="7452360" y="2556000"/>
-            <a:ext cx="1413720" cy="850320"/>
+            <a:ext cx="1413360" cy="849960"/>
           </a:xfrm>
           <a:prstGeom prst="rect">
             <a:avLst/>
@@ -8537,7 +8639,7 @@
         <p:spPr>
           <a:xfrm>
             <a:off x="504360" y="3230640"/>
-            <a:ext cx="6946560" cy="388080"/>
+            <a:ext cx="6946200" cy="387720"/>
           </a:xfrm>
           <a:prstGeom prst="rect">
             <a:avLst/>
@@ -8588,7 +8690,7 @@
         <p:spPr>
           <a:xfrm>
             <a:off x="504360" y="3812400"/>
-            <a:ext cx="2824920" cy="898920"/>
+            <a:ext cx="2824560" cy="898560"/>
           </a:xfrm>
           <a:prstGeom prst="rect">
             <a:avLst/>
@@ -8882,7 +8984,7 @@
         <p:spPr>
           <a:xfrm>
             <a:off x="539640" y="0"/>
-            <a:ext cx="6073200" cy="718200"/>
+            <a:ext cx="6072840" cy="717840"/>
           </a:xfrm>
           <a:prstGeom prst="rect">
             <a:avLst/>
@@ -8931,7 +9033,7 @@
         <p:spPr>
           <a:xfrm>
             <a:off x="2124360" y="2490120"/>
-            <a:ext cx="5758200" cy="598320"/>
+            <a:ext cx="5757840" cy="597960"/>
           </a:xfrm>
           <a:prstGeom prst="rect">
             <a:avLst/>
@@ -8983,7 +9085,7 @@
         <p:spPr>
           <a:xfrm>
             <a:off x="2124360" y="3240000"/>
-            <a:ext cx="5758200" cy="598320"/>
+            <a:ext cx="5757840" cy="597960"/>
           </a:xfrm>
           <a:prstGeom prst="rect">
             <a:avLst/>
@@ -9035,7 +9137,7 @@
         <p:spPr>
           <a:xfrm>
             <a:off x="2124360" y="3988440"/>
-            <a:ext cx="5758200" cy="598320"/>
+            <a:ext cx="5757840" cy="597960"/>
           </a:xfrm>
           <a:prstGeom prst="rect">
             <a:avLst/>
@@ -9087,7 +9189,7 @@
         <p:spPr>
           <a:xfrm>
             <a:off x="2124360" y="1739880"/>
-            <a:ext cx="5758200" cy="598320"/>
+            <a:ext cx="5757840" cy="597960"/>
           </a:xfrm>
           <a:prstGeom prst="rect">
             <a:avLst/>
@@ -9139,7 +9241,7 @@
         <p:spPr>
           <a:xfrm>
             <a:off x="1115640" y="1800000"/>
-            <a:ext cx="601560" cy="478080"/>
+            <a:ext cx="601200" cy="477720"/>
           </a:xfrm>
           <a:prstGeom prst="roundRect">
             <a:avLst>
@@ -9208,7 +9310,7 @@
         <p:spPr>
           <a:xfrm>
             <a:off x="1115640" y="2549880"/>
-            <a:ext cx="601560" cy="478080"/>
+            <a:ext cx="601200" cy="477720"/>
           </a:xfrm>
           <a:prstGeom prst="roundRect">
             <a:avLst>
@@ -9277,7 +9379,7 @@
         <p:spPr>
           <a:xfrm>
             <a:off x="1115640" y="3300120"/>
-            <a:ext cx="601560" cy="478080"/>
+            <a:ext cx="601200" cy="477720"/>
           </a:xfrm>
           <a:prstGeom prst="roundRect">
             <a:avLst>
@@ -9346,7 +9448,7 @@
         <p:spPr>
           <a:xfrm>
             <a:off x="1115640" y="4050000"/>
-            <a:ext cx="601560" cy="478080"/>
+            <a:ext cx="601200" cy="477720"/>
           </a:xfrm>
           <a:prstGeom prst="roundRect">
             <a:avLst>
@@ -9467,7 +9569,7 @@
         <p:spPr>
           <a:xfrm>
             <a:off x="683640" y="297360"/>
-            <a:ext cx="8098200" cy="398520"/>
+            <a:ext cx="8097840" cy="398160"/>
           </a:xfrm>
           <a:prstGeom prst="rect">
             <a:avLst/>
@@ -9518,7 +9620,7 @@
         <p:spPr>
           <a:xfrm>
             <a:off x="508320" y="952200"/>
-            <a:ext cx="7895520" cy="4078080"/>
+            <a:ext cx="7895160" cy="4077720"/>
           </a:xfrm>
           <a:prstGeom prst="rect">
             <a:avLst/>
@@ -9550,7 +9652,7 @@
             </a:endParaRPr>
           </a:p>
           <a:p>
-            <a:pPr lvl="1" marL="270000" indent="-268200">
+            <a:pPr lvl="1" marL="270000" indent="-267840">
               <a:lnSpc>
                 <a:spcPct val="100000"/>
               </a:lnSpc>
@@ -9616,7 +9718,7 @@
             </a:endParaRPr>
           </a:p>
           <a:p>
-            <a:pPr lvl="1" marL="270000" indent="-268200">
+            <a:pPr lvl="1" marL="270000" indent="-267840">
               <a:lnSpc>
                 <a:spcPct val="100000"/>
               </a:lnSpc>
@@ -9662,7 +9764,7 @@
             </a:endParaRPr>
           </a:p>
           <a:p>
-            <a:pPr lvl="1" marL="270000" indent="-268200">
+            <a:pPr lvl="1" marL="270000" indent="-267840">
               <a:lnSpc>
                 <a:spcPct val="100000"/>
               </a:lnSpc>
@@ -9698,7 +9800,7 @@
             </a:endParaRPr>
           </a:p>
           <a:p>
-            <a:pPr lvl="1" marL="270000" indent="-268200">
+            <a:pPr lvl="1" marL="270000" indent="-267840">
               <a:lnSpc>
                 <a:spcPct val="100000"/>
               </a:lnSpc>
@@ -9734,7 +9836,7 @@
             </a:endParaRPr>
           </a:p>
           <a:p>
-            <a:pPr lvl="2" marL="1296000" indent="-286560">
+            <a:pPr lvl="2" marL="1296000" indent="-286200">
               <a:lnSpc>
                 <a:spcPct val="100000"/>
               </a:lnSpc>
@@ -9763,7 +9865,7 @@
             </a:endParaRPr>
           </a:p>
           <a:p>
-            <a:pPr lvl="2" marL="1296000" indent="-286560">
+            <a:pPr lvl="2" marL="1296000" indent="-286200">
               <a:lnSpc>
                 <a:spcPct val="100000"/>
               </a:lnSpc>
@@ -9792,7 +9894,7 @@
             </a:endParaRPr>
           </a:p>
           <a:p>
-            <a:pPr lvl="1" marL="270000" indent="-268200">
+            <a:pPr lvl="1" marL="270000" indent="-267840">
               <a:lnSpc>
                 <a:spcPct val="100000"/>
               </a:lnSpc>
@@ -9920,7 +10022,7 @@
         <p:spPr>
           <a:xfrm>
             <a:off x="683640" y="297360"/>
-            <a:ext cx="4376160" cy="398520"/>
+            <a:ext cx="4375800" cy="398160"/>
           </a:xfrm>
           <a:prstGeom prst="rect">
             <a:avLst/>
@@ -9975,7 +10077,7 @@
         <p:spPr>
           <a:xfrm>
             <a:off x="269640" y="901800"/>
-            <a:ext cx="7455240" cy="4743720"/>
+            <a:ext cx="7454880" cy="4743360"/>
           </a:xfrm>
           <a:prstGeom prst="rect">
             <a:avLst/>
@@ -10001,7 +10103,7 @@
         <p:spPr>
           <a:xfrm>
             <a:off x="6209640" y="539640"/>
-            <a:ext cx="2911680" cy="295920"/>
+            <a:ext cx="2911320" cy="295560"/>
           </a:xfrm>
           <a:prstGeom prst="rect">
             <a:avLst/>
@@ -10246,7 +10348,7 @@
         <p:spPr>
           <a:xfrm>
             <a:off x="539640" y="0"/>
-            <a:ext cx="6073200" cy="718200"/>
+            <a:ext cx="6072840" cy="717840"/>
           </a:xfrm>
           <a:prstGeom prst="rect">
             <a:avLst/>
@@ -10295,7 +10397,7 @@
         <p:spPr>
           <a:xfrm>
             <a:off x="2124360" y="2490120"/>
-            <a:ext cx="5758200" cy="598320"/>
+            <a:ext cx="5757840" cy="597960"/>
           </a:xfrm>
           <a:prstGeom prst="rect">
             <a:avLst/>
@@ -10347,7 +10449,7 @@
         <p:spPr>
           <a:xfrm>
             <a:off x="2124360" y="3240000"/>
-            <a:ext cx="5758200" cy="598320"/>
+            <a:ext cx="5757840" cy="597960"/>
           </a:xfrm>
           <a:prstGeom prst="rect">
             <a:avLst/>
@@ -10399,7 +10501,7 @@
         <p:spPr>
           <a:xfrm>
             <a:off x="2124360" y="3988440"/>
-            <a:ext cx="5758200" cy="598320"/>
+            <a:ext cx="5757840" cy="597960"/>
           </a:xfrm>
           <a:prstGeom prst="rect">
             <a:avLst/>
@@ -10451,7 +10553,7 @@
         <p:spPr>
           <a:xfrm>
             <a:off x="2124360" y="1739880"/>
-            <a:ext cx="5758200" cy="598320"/>
+            <a:ext cx="5757840" cy="597960"/>
           </a:xfrm>
           <a:prstGeom prst="rect">
             <a:avLst/>
@@ -10503,7 +10605,7 @@
         <p:spPr>
           <a:xfrm>
             <a:off x="1115640" y="1800000"/>
-            <a:ext cx="601560" cy="478080"/>
+            <a:ext cx="601200" cy="477720"/>
           </a:xfrm>
           <a:prstGeom prst="roundRect">
             <a:avLst>
@@ -10572,7 +10674,7 @@
         <p:spPr>
           <a:xfrm>
             <a:off x="1115640" y="2549880"/>
-            <a:ext cx="601560" cy="478080"/>
+            <a:ext cx="601200" cy="477720"/>
           </a:xfrm>
           <a:prstGeom prst="roundRect">
             <a:avLst>
@@ -10641,7 +10743,7 @@
         <p:spPr>
           <a:xfrm>
             <a:off x="1115640" y="3300120"/>
-            <a:ext cx="601560" cy="478080"/>
+            <a:ext cx="601200" cy="477720"/>
           </a:xfrm>
           <a:prstGeom prst="roundRect">
             <a:avLst>
@@ -10710,7 +10812,7 @@
         <p:spPr>
           <a:xfrm>
             <a:off x="1115640" y="4050000"/>
-            <a:ext cx="601560" cy="478080"/>
+            <a:ext cx="601200" cy="477720"/>
           </a:xfrm>
           <a:prstGeom prst="roundRect">
             <a:avLst>
@@ -10831,7 +10933,7 @@
         <p:spPr>
           <a:xfrm>
             <a:off x="716040" y="137160"/>
-            <a:ext cx="6073200" cy="718200"/>
+            <a:ext cx="6072840" cy="717840"/>
           </a:xfrm>
           <a:prstGeom prst="rect">
             <a:avLst/>
@@ -10886,7 +10988,7 @@
         <p:spPr>
           <a:xfrm>
             <a:off x="365760" y="982800"/>
-            <a:ext cx="5302080" cy="4427640"/>
+            <a:ext cx="5301720" cy="4427280"/>
           </a:xfrm>
           <a:prstGeom prst="rect">
             <a:avLst/>
@@ -10912,7 +11014,7 @@
         <p:spPr>
           <a:xfrm>
             <a:off x="365760" y="5434920"/>
-            <a:ext cx="4248000" cy="272880"/>
+            <a:ext cx="4247640" cy="272520"/>
           </a:xfrm>
           <a:prstGeom prst="rect">
             <a:avLst/>
@@ -10964,7 +11066,7 @@
         <p:spPr>
           <a:xfrm>
             <a:off x="5760720" y="1281600"/>
-            <a:ext cx="3290400" cy="1942200"/>
+            <a:ext cx="3290040" cy="1941840"/>
           </a:xfrm>
           <a:prstGeom prst="rect">
             <a:avLst/>
@@ -11009,7 +11111,7 @@
             </a:endParaRPr>
           </a:p>
           <a:p>
-            <a:pPr marL="216000" indent="-214560">
+            <a:pPr marL="216000" indent="-214200">
               <a:lnSpc>
                 <a:spcPct val="100000"/>
               </a:lnSpc>
@@ -11041,7 +11143,7 @@
             </a:endParaRPr>
           </a:p>
           <a:p>
-            <a:pPr marL="216000" indent="-214560">
+            <a:pPr marL="216000" indent="-214200">
               <a:lnSpc>
                 <a:spcPct val="100000"/>
               </a:lnSpc>
@@ -11135,7 +11237,7 @@
         <p:spPr>
           <a:xfrm>
             <a:off x="716040" y="101880"/>
-            <a:ext cx="6073200" cy="718200"/>
+            <a:ext cx="6072840" cy="717840"/>
           </a:xfrm>
           <a:prstGeom prst="rect">
             <a:avLst/>
@@ -11206,9 +11308,9 @@
         <p:grpSpPr>
           <a:xfrm>
             <a:off x="513000" y="973800"/>
-            <a:ext cx="8190000" cy="856800"/>
+            <a:ext cx="8189640" cy="856440"/>
             <a:chOff x="513000" y="973800"/>
-            <a:chExt cx="8190000" cy="856800"/>
+            <a:chExt cx="8189640" cy="856440"/>
           </a:xfrm>
         </p:grpSpPr>
         <p:pic>
@@ -11219,13 +11321,13 @@
           </p:nvPicPr>
           <p:blipFill>
             <a:blip r:embed="rId1"/>
-            <a:srcRect l="0" t="24514" r="84719" b="65623"/>
+            <a:srcRect l="0" t="24511" r="84705" b="65616"/>
             <a:stretch/>
           </p:blipFill>
           <p:spPr>
             <a:xfrm>
               <a:off x="513000" y="973800"/>
-              <a:ext cx="638280" cy="546840"/>
+              <a:ext cx="637920" cy="546480"/>
             </a:xfrm>
             <a:prstGeom prst="rect">
               <a:avLst/>
@@ -11244,7 +11346,7 @@
           <p:spPr>
             <a:xfrm>
               <a:off x="1152720" y="973800"/>
-              <a:ext cx="7550280" cy="856800"/>
+              <a:ext cx="7549920" cy="856440"/>
             </a:xfrm>
             <a:prstGeom prst="rect">
               <a:avLst/>
@@ -11304,9 +11406,9 @@
         <p:grpSpPr>
           <a:xfrm>
             <a:off x="513000" y="1944360"/>
-            <a:ext cx="8374320" cy="993960"/>
+            <a:ext cx="8373960" cy="993600"/>
             <a:chOff x="513000" y="1944360"/>
-            <a:chExt cx="8374320" cy="993960"/>
+            <a:chExt cx="8373960" cy="993600"/>
           </a:xfrm>
         </p:grpSpPr>
         <p:sp>
@@ -11318,7 +11420,7 @@
           <p:spPr>
             <a:xfrm>
               <a:off x="1152720" y="1944360"/>
-              <a:ext cx="7734600" cy="993960"/>
+              <a:ext cx="7734240" cy="993600"/>
             </a:xfrm>
             <a:prstGeom prst="rect">
               <a:avLst/>
@@ -11376,13 +11478,13 @@
           </p:nvPicPr>
           <p:blipFill>
             <a:blip r:embed="rId2"/>
-            <a:srcRect l="0" t="40239" r="86271" b="50112"/>
+            <a:srcRect l="0" t="40236" r="86257" b="50105"/>
             <a:stretch/>
           </p:blipFill>
           <p:spPr>
             <a:xfrm>
               <a:off x="513000" y="1944360"/>
-              <a:ext cx="586080" cy="546840"/>
+              <a:ext cx="585720" cy="546480"/>
             </a:xfrm>
             <a:prstGeom prst="rect">
               <a:avLst/>
@@ -11402,9 +11504,9 @@
         <p:grpSpPr>
           <a:xfrm>
             <a:off x="513000" y="3039480"/>
-            <a:ext cx="8136360" cy="856800"/>
+            <a:ext cx="8136000" cy="856440"/>
             <a:chOff x="513000" y="3039480"/>
-            <a:chExt cx="8136360" cy="856800"/>
+            <a:chExt cx="8136000" cy="856440"/>
           </a:xfrm>
         </p:grpSpPr>
         <p:sp>
@@ -11416,7 +11518,7 @@
           <p:spPr>
             <a:xfrm>
               <a:off x="1152720" y="3039480"/>
-              <a:ext cx="7496640" cy="856800"/>
+              <a:ext cx="7496280" cy="856440"/>
             </a:xfrm>
             <a:prstGeom prst="rect">
               <a:avLst/>
@@ -11474,13 +11576,13 @@
           </p:nvPicPr>
           <p:blipFill>
             <a:blip r:embed="rId3"/>
-            <a:srcRect l="0" t="59424" r="86271" b="30927"/>
+            <a:srcRect l="0" t="59417" r="86257" b="30923"/>
             <a:stretch/>
           </p:blipFill>
           <p:spPr>
             <a:xfrm>
               <a:off x="513000" y="3039480"/>
-              <a:ext cx="585720" cy="546840"/>
+              <a:ext cx="585360" cy="546480"/>
             </a:xfrm>
             <a:prstGeom prst="rect">
               <a:avLst/>
@@ -11500,9 +11602,9 @@
         <p:grpSpPr>
           <a:xfrm>
             <a:off x="513000" y="4097520"/>
-            <a:ext cx="8438040" cy="856800"/>
+            <a:ext cx="8437680" cy="856440"/>
             <a:chOff x="513000" y="4097520"/>
-            <a:chExt cx="8438040" cy="856800"/>
+            <a:chExt cx="8437680" cy="856440"/>
           </a:xfrm>
         </p:grpSpPr>
         <p:sp>
@@ -11514,7 +11616,7 @@
           <p:spPr>
             <a:xfrm>
               <a:off x="1152720" y="4097520"/>
-              <a:ext cx="7798320" cy="856800"/>
+              <a:ext cx="7797960" cy="856440"/>
             </a:xfrm>
             <a:prstGeom prst="rect">
               <a:avLst/>
@@ -11572,13 +11674,13 @@
           </p:nvPicPr>
           <p:blipFill>
             <a:blip r:embed="rId4"/>
-            <a:srcRect l="0" t="81825" r="86271" b="7741"/>
+            <a:srcRect l="0" t="81818" r="86257" b="7741"/>
             <a:stretch/>
           </p:blipFill>
           <p:spPr>
             <a:xfrm>
               <a:off x="513000" y="4097520"/>
-              <a:ext cx="585720" cy="592560"/>
+              <a:ext cx="585360" cy="592200"/>
             </a:xfrm>
             <a:prstGeom prst="rect">
               <a:avLst/>
@@ -11598,7 +11700,7 @@
         <p:spPr>
           <a:xfrm>
             <a:off x="2321280" y="5245920"/>
-            <a:ext cx="6808680" cy="430200"/>
+            <a:ext cx="6808320" cy="429840"/>
           </a:xfrm>
           <a:prstGeom prst="rect">
             <a:avLst/>
@@ -12004,7 +12106,7 @@
         <p:spPr>
           <a:xfrm>
             <a:off x="683640" y="297360"/>
-            <a:ext cx="8098200" cy="398520"/>
+            <a:ext cx="8097840" cy="398160"/>
           </a:xfrm>
           <a:prstGeom prst="rect">
             <a:avLst/>
@@ -12065,7 +12167,7 @@
         <p:spPr>
           <a:xfrm>
             <a:off x="504000" y="972720"/>
-            <a:ext cx="7357320" cy="1658520"/>
+            <a:ext cx="7356960" cy="1658160"/>
           </a:xfrm>
           <a:prstGeom prst="rect">
             <a:avLst/>
@@ -12084,7 +12186,7 @@
         <p:txBody>
           <a:bodyPr lIns="0" rIns="0" tIns="0" bIns="0"/>
           <a:p>
-            <a:pPr lvl="1" marL="270000" indent="-268200">
+            <a:pPr lvl="1" marL="270000" indent="-267840">
               <a:lnSpc>
                 <a:spcPct val="100000"/>
               </a:lnSpc>
@@ -12110,7 +12212,7 @@
             </a:endParaRPr>
           </a:p>
           <a:p>
-            <a:pPr lvl="1" marL="270000" indent="-268200">
+            <a:pPr lvl="1" marL="270000" indent="-267840">
               <a:lnSpc>
                 <a:spcPct val="100000"/>
               </a:lnSpc>
@@ -12136,7 +12238,7 @@
             </a:endParaRPr>
           </a:p>
           <a:p>
-            <a:pPr lvl="1" marL="270000" indent="-268200">
+            <a:pPr lvl="1" marL="270000" indent="-267840">
               <a:lnSpc>
                 <a:spcPct val="100000"/>
               </a:lnSpc>
@@ -12162,7 +12264,7 @@
             </a:endParaRPr>
           </a:p>
           <a:p>
-            <a:pPr lvl="1" marL="270000" indent="-268200">
+            <a:pPr lvl="1" marL="270000" indent="-267840">
               <a:lnSpc>
                 <a:spcPct val="100000"/>
               </a:lnSpc>
@@ -12224,7 +12326,7 @@
         <p:spPr>
           <a:xfrm>
             <a:off x="428760" y="2811600"/>
-            <a:ext cx="8502840" cy="2743920"/>
+            <a:ext cx="8502480" cy="2743560"/>
           </a:xfrm>
           <a:prstGeom prst="rect">
             <a:avLst/>
@@ -12266,7 +12368,7 @@
             </a:endParaRPr>
           </a:p>
           <a:p>
-            <a:pPr lvl="1" marL="270000" indent="-268200">
+            <a:pPr lvl="1" marL="270000" indent="-267840">
               <a:lnSpc>
                 <a:spcPct val="100000"/>
               </a:lnSpc>
@@ -12292,7 +12394,7 @@
             </a:endParaRPr>
           </a:p>
           <a:p>
-            <a:pPr lvl="1" marL="270000" indent="-268200">
+            <a:pPr lvl="1" marL="270000" indent="-267840">
               <a:lnSpc>
                 <a:spcPct val="100000"/>
               </a:lnSpc>
@@ -12318,7 +12420,7 @@
             </a:endParaRPr>
           </a:p>
           <a:p>
-            <a:pPr lvl="1" marL="270000" indent="-268200">
+            <a:pPr lvl="1" marL="270000" indent="-267840">
               <a:lnSpc>
                 <a:spcPct val="100000"/>
               </a:lnSpc>
@@ -12344,7 +12446,7 @@
             </a:endParaRPr>
           </a:p>
           <a:p>
-            <a:pPr lvl="1" marL="270000" indent="-268200">
+            <a:pPr lvl="1" marL="270000" indent="-267840">
               <a:lnSpc>
                 <a:spcPct val="100000"/>
               </a:lnSpc>
@@ -12655,7 +12757,7 @@
         <p:spPr>
           <a:xfrm>
             <a:off x="539640" y="0"/>
-            <a:ext cx="6073200" cy="718200"/>
+            <a:ext cx="6072840" cy="717840"/>
           </a:xfrm>
           <a:prstGeom prst="rect">
             <a:avLst/>
@@ -12704,7 +12806,7 @@
         <p:spPr>
           <a:xfrm>
             <a:off x="2124360" y="2490120"/>
-            <a:ext cx="5758200" cy="598320"/>
+            <a:ext cx="5757840" cy="597960"/>
           </a:xfrm>
           <a:prstGeom prst="rect">
             <a:avLst/>
@@ -12756,7 +12858,7 @@
         <p:spPr>
           <a:xfrm>
             <a:off x="2124360" y="3240000"/>
-            <a:ext cx="5758200" cy="598320"/>
+            <a:ext cx="5757840" cy="597960"/>
           </a:xfrm>
           <a:prstGeom prst="rect">
             <a:avLst/>
@@ -12808,7 +12910,7 @@
         <p:spPr>
           <a:xfrm>
             <a:off x="2124360" y="3988440"/>
-            <a:ext cx="5758200" cy="598320"/>
+            <a:ext cx="5757840" cy="597960"/>
           </a:xfrm>
           <a:prstGeom prst="rect">
             <a:avLst/>
@@ -12860,7 +12962,7 @@
         <p:spPr>
           <a:xfrm>
             <a:off x="2124360" y="1739880"/>
-            <a:ext cx="5758200" cy="598320"/>
+            <a:ext cx="5757840" cy="597960"/>
           </a:xfrm>
           <a:prstGeom prst="rect">
             <a:avLst/>
@@ -12912,7 +13014,7 @@
         <p:spPr>
           <a:xfrm>
             <a:off x="1115640" y="1800000"/>
-            <a:ext cx="601560" cy="478080"/>
+            <a:ext cx="601200" cy="477720"/>
           </a:xfrm>
           <a:prstGeom prst="roundRect">
             <a:avLst>
@@ -12981,7 +13083,7 @@
         <p:spPr>
           <a:xfrm>
             <a:off x="1115640" y="2549880"/>
-            <a:ext cx="601560" cy="478080"/>
+            <a:ext cx="601200" cy="477720"/>
           </a:xfrm>
           <a:prstGeom prst="roundRect">
             <a:avLst>
@@ -13050,7 +13152,7 @@
         <p:spPr>
           <a:xfrm>
             <a:off x="1115640" y="3300120"/>
-            <a:ext cx="601560" cy="478080"/>
+            <a:ext cx="601200" cy="477720"/>
           </a:xfrm>
           <a:prstGeom prst="roundRect">
             <a:avLst>
@@ -13119,7 +13221,7 @@
         <p:spPr>
           <a:xfrm>
             <a:off x="1115640" y="4050000"/>
-            <a:ext cx="601560" cy="478080"/>
+            <a:ext cx="601200" cy="477720"/>
           </a:xfrm>
           <a:prstGeom prst="roundRect">
             <a:avLst>
@@ -13240,7 +13342,7 @@
         <p:spPr>
           <a:xfrm>
             <a:off x="683640" y="297360"/>
-            <a:ext cx="5353920" cy="398520"/>
+            <a:ext cx="5353560" cy="398160"/>
           </a:xfrm>
           <a:prstGeom prst="rect">
             <a:avLst/>
@@ -13291,7 +13393,7 @@
         <p:spPr>
           <a:xfrm>
             <a:off x="512640" y="1134720"/>
-            <a:ext cx="4967280" cy="2239920"/>
+            <a:ext cx="4966920" cy="2239560"/>
           </a:xfrm>
           <a:prstGeom prst="rect">
             <a:avLst/>
@@ -13333,7 +13435,7 @@
             </a:endParaRPr>
           </a:p>
           <a:p>
-            <a:pPr lvl="2" marL="727200" indent="-268200">
+            <a:pPr lvl="2" marL="727200" indent="-267840">
               <a:lnSpc>
                 <a:spcPct val="100000"/>
               </a:lnSpc>
@@ -13359,7 +13461,7 @@
             </a:endParaRPr>
           </a:p>
           <a:p>
-            <a:pPr lvl="2" marL="727200" indent="-268200">
+            <a:pPr lvl="2" marL="727200" indent="-267840">
               <a:lnSpc>
                 <a:spcPct val="100000"/>
               </a:lnSpc>
@@ -13385,7 +13487,7 @@
             </a:endParaRPr>
           </a:p>
           <a:p>
-            <a:pPr lvl="2" marL="727200" indent="-268200">
+            <a:pPr lvl="2" marL="727200" indent="-267840">
               <a:lnSpc>
                 <a:spcPct val="100000"/>
               </a:lnSpc>
@@ -13457,7 +13559,7 @@
         <p:spPr>
           <a:xfrm>
             <a:off x="1281240" y="3126960"/>
-            <a:ext cx="6499800" cy="1214280"/>
+            <a:ext cx="6499440" cy="1213920"/>
           </a:xfrm>
           <a:prstGeom prst="rect">
             <a:avLst/>
@@ -13476,7 +13578,7 @@
         <p:txBody>
           <a:bodyPr lIns="90000" rIns="90000" tIns="45000" bIns="45000"/>
           <a:p>
-            <a:pPr marL="285840" indent="-284400">
+            <a:pPr marL="285840" indent="-284040">
               <a:lnSpc>
                 <a:spcPct val="100000"/>
               </a:lnSpc>
@@ -13504,7 +13606,7 @@
             </a:endParaRPr>
           </a:p>
           <a:p>
-            <a:pPr marL="285840" indent="-284400">
+            <a:pPr marL="285840" indent="-284040">
               <a:lnSpc>
                 <a:spcPct val="100000"/>
               </a:lnSpc>
@@ -13594,7 +13696,7 @@
         <p:spPr>
           <a:xfrm>
             <a:off x="683640" y="297360"/>
-            <a:ext cx="8098200" cy="398520"/>
+            <a:ext cx="8097840" cy="398160"/>
           </a:xfrm>
           <a:prstGeom prst="rect">
             <a:avLst/>
@@ -13645,7 +13747,7 @@
         <p:spPr>
           <a:xfrm>
             <a:off x="512640" y="3072240"/>
-            <a:ext cx="7207920" cy="1483200"/>
+            <a:ext cx="7207560" cy="1482840"/>
           </a:xfrm>
           <a:prstGeom prst="rect">
             <a:avLst/>
@@ -13664,7 +13766,7 @@
         <p:txBody>
           <a:bodyPr lIns="0" rIns="0" tIns="0" bIns="0"/>
           <a:p>
-            <a:pPr lvl="1" marL="270000" indent="-268200">
+            <a:pPr lvl="1" marL="270000" indent="-267840">
               <a:lnSpc>
                 <a:spcPct val="100000"/>
               </a:lnSpc>
@@ -13700,7 +13802,7 @@
             </a:endParaRPr>
           </a:p>
           <a:p>
-            <a:pPr lvl="1" marL="270000" indent="-268200">
+            <a:pPr lvl="1" marL="270000" indent="-267840">
               <a:lnSpc>
                 <a:spcPct val="100000"/>
               </a:lnSpc>
@@ -13746,7 +13848,7 @@
             </a:endParaRPr>
           </a:p>
           <a:p>
-            <a:pPr lvl="1" marL="270000" indent="-268200">
+            <a:pPr lvl="1" marL="270000" indent="-267840">
               <a:lnSpc>
                 <a:spcPct val="100000"/>
               </a:lnSpc>
@@ -13842,7 +13944,7 @@
         <p:spPr>
           <a:xfrm>
             <a:off x="556560" y="984240"/>
-            <a:ext cx="7580160" cy="1931760"/>
+            <a:ext cx="7579800" cy="1931400"/>
           </a:xfrm>
           <a:prstGeom prst="rect">
             <a:avLst/>
@@ -13861,9 +13963,9 @@
         <p:grpSpPr>
           <a:xfrm>
             <a:off x="1645920" y="4875120"/>
-            <a:ext cx="4683240" cy="344880"/>
+            <a:ext cx="4682880" cy="344520"/>
             <a:chOff x="1645920" y="4875120"/>
-            <a:chExt cx="4683240" cy="344880"/>
+            <a:chExt cx="4682880" cy="344520"/>
           </a:xfrm>
         </p:grpSpPr>
         <p:sp>
@@ -13875,7 +13977,7 @@
           <p:spPr>
             <a:xfrm>
               <a:off x="1645920" y="4891680"/>
-              <a:ext cx="558360" cy="318960"/>
+              <a:ext cx="558000" cy="318600"/>
             </a:xfrm>
             <a:custGeom>
               <a:avLst/>
@@ -13943,7 +14045,7 @@
           <p:spPr>
             <a:xfrm>
               <a:off x="2258280" y="4875120"/>
-              <a:ext cx="4070880" cy="344880"/>
+              <a:ext cx="4070520" cy="344520"/>
             </a:xfrm>
             <a:prstGeom prst="rect">
               <a:avLst/>
@@ -14045,7 +14147,7 @@
         <p:spPr>
           <a:xfrm>
             <a:off x="683640" y="297360"/>
-            <a:ext cx="3738240" cy="398520"/>
+            <a:ext cx="3737880" cy="398160"/>
           </a:xfrm>
           <a:prstGeom prst="rect">
             <a:avLst/>
@@ -14096,7 +14198,7 @@
         <p:spPr>
           <a:xfrm>
             <a:off x="768240" y="1019520"/>
-            <a:ext cx="902880" cy="398520"/>
+            <a:ext cx="902520" cy="398160"/>
           </a:xfrm>
           <a:prstGeom prst="rect">
             <a:avLst/>
@@ -14147,7 +14249,7 @@
         <p:spPr>
           <a:xfrm>
             <a:off x="768240" y="2671560"/>
-            <a:ext cx="824760" cy="398520"/>
+            <a:ext cx="824400" cy="398160"/>
           </a:xfrm>
           <a:prstGeom prst="rect">
             <a:avLst/>
@@ -14198,7 +14300,7 @@
         <p:spPr>
           <a:xfrm>
             <a:off x="768240" y="4665960"/>
-            <a:ext cx="987120" cy="398520"/>
+            <a:ext cx="986760" cy="398160"/>
           </a:xfrm>
           <a:prstGeom prst="rect">
             <a:avLst/>
@@ -14249,7 +14351,7 @@
         <p:spPr>
           <a:xfrm>
             <a:off x="3079800" y="1103400"/>
-            <a:ext cx="5686920" cy="1548720"/>
+            <a:ext cx="5686560" cy="1548360"/>
           </a:xfrm>
           <a:prstGeom prst="rect">
             <a:avLst/>
@@ -14268,7 +14370,7 @@
         <p:txBody>
           <a:bodyPr lIns="90000" rIns="90000" tIns="45000" bIns="45000"/>
           <a:p>
-            <a:pPr marL="193680" indent="-192240">
+            <a:pPr marL="193680" indent="-191880">
               <a:lnSpc>
                 <a:spcPct val="100000"/>
               </a:lnSpc>
@@ -14293,7 +14395,7 @@
             </a:endParaRPr>
           </a:p>
           <a:p>
-            <a:pPr marL="193680" indent="-192240">
+            <a:pPr marL="193680" indent="-191880">
               <a:lnSpc>
                 <a:spcPct val="100000"/>
               </a:lnSpc>
@@ -14318,7 +14420,7 @@
             </a:endParaRPr>
           </a:p>
           <a:p>
-            <a:pPr marL="193680" indent="-192240">
+            <a:pPr marL="193680" indent="-191880">
               <a:lnSpc>
                 <a:spcPct val="100000"/>
               </a:lnSpc>
@@ -14353,7 +14455,7 @@
         <p:spPr>
           <a:xfrm>
             <a:off x="1972440" y="1052640"/>
-            <a:ext cx="1026360" cy="398520"/>
+            <a:ext cx="1026000" cy="398160"/>
           </a:xfrm>
           <a:prstGeom prst="rect">
             <a:avLst/>
@@ -14404,7 +14506,7 @@
         <p:spPr>
           <a:xfrm>
             <a:off x="2012040" y="1786320"/>
-            <a:ext cx="1026360" cy="398520"/>
+            <a:ext cx="1026000" cy="398160"/>
           </a:xfrm>
           <a:prstGeom prst="rect">
             <a:avLst/>
@@ -14455,7 +14557,7 @@
         <p:spPr>
           <a:xfrm>
             <a:off x="3119760" y="2738160"/>
-            <a:ext cx="5686920" cy="1549440"/>
+            <a:ext cx="5686560" cy="1549080"/>
           </a:xfrm>
           <a:prstGeom prst="rect">
             <a:avLst/>
@@ -14474,7 +14576,7 @@
         <p:txBody>
           <a:bodyPr lIns="90000" rIns="90000" tIns="45000" bIns="45000"/>
           <a:p>
-            <a:pPr marL="193680" indent="-192240">
+            <a:pPr marL="193680" indent="-191880">
               <a:lnSpc>
                 <a:spcPct val="100000"/>
               </a:lnSpc>
@@ -14509,7 +14611,7 @@
             </a:endParaRPr>
           </a:p>
           <a:p>
-            <a:pPr marL="193680" indent="-192240">
+            <a:pPr marL="193680" indent="-191880">
               <a:lnSpc>
                 <a:spcPct val="100000"/>
               </a:lnSpc>
@@ -14534,7 +14636,7 @@
             </a:endParaRPr>
           </a:p>
           <a:p>
-            <a:pPr marL="193680" indent="-192240">
+            <a:pPr marL="193680" indent="-191880">
               <a:lnSpc>
                 <a:spcPct val="100000"/>
               </a:lnSpc>
@@ -14579,7 +14681,7 @@
         <p:spPr>
           <a:xfrm>
             <a:off x="2012040" y="2687760"/>
-            <a:ext cx="1026360" cy="398520"/>
+            <a:ext cx="1026000" cy="398160"/>
           </a:xfrm>
           <a:prstGeom prst="rect">
             <a:avLst/>
@@ -14630,7 +14732,7 @@
         <p:spPr>
           <a:xfrm>
             <a:off x="2052000" y="3421440"/>
-            <a:ext cx="1026360" cy="398520"/>
+            <a:ext cx="1026000" cy="398160"/>
           </a:xfrm>
           <a:prstGeom prst="rect">
             <a:avLst/>
@@ -14681,7 +14783,7 @@
         <p:spPr>
           <a:xfrm>
             <a:off x="3119760" y="4410720"/>
-            <a:ext cx="5686920" cy="819360"/>
+            <a:ext cx="5686560" cy="819000"/>
           </a:xfrm>
           <a:prstGeom prst="rect">
             <a:avLst/>
@@ -14700,7 +14802,7 @@
         <p:txBody>
           <a:bodyPr lIns="90000" rIns="90000" tIns="45000" bIns="45000"/>
           <a:p>
-            <a:pPr marL="193680" indent="-192240">
+            <a:pPr marL="193680" indent="-191880">
               <a:lnSpc>
                 <a:spcPct val="100000"/>
               </a:lnSpc>
@@ -14725,7 +14827,7 @@
             </a:endParaRPr>
           </a:p>
           <a:p>
-            <a:pPr marL="193680" indent="-192240">
+            <a:pPr marL="193680" indent="-191880">
               <a:lnSpc>
                 <a:spcPct val="100000"/>
               </a:lnSpc>
@@ -14750,7 +14852,7 @@
             </a:endParaRPr>
           </a:p>
           <a:p>
-            <a:pPr marL="193680" indent="-192240">
+            <a:pPr marL="193680" indent="-191880">
               <a:lnSpc>
                 <a:spcPct val="100000"/>
               </a:lnSpc>
@@ -14775,7 +14877,7 @@
             </a:endParaRPr>
           </a:p>
           <a:p>
-            <a:pPr marL="193680" indent="-192240">
+            <a:pPr marL="193680" indent="-191880">
               <a:lnSpc>
                 <a:spcPct val="100000"/>
               </a:lnSpc>
@@ -14800,7 +14902,7 @@
             </a:endParaRPr>
           </a:p>
           <a:p>
-            <a:pPr marL="193680" indent="-192240">
+            <a:pPr marL="193680" indent="-191880">
               <a:lnSpc>
                 <a:spcPct val="100000"/>
               </a:lnSpc>
@@ -14835,7 +14937,7 @@
         <p:spPr>
           <a:xfrm>
             <a:off x="2012040" y="4691520"/>
-            <a:ext cx="1026360" cy="398520"/>
+            <a:ext cx="1026000" cy="398160"/>
           </a:xfrm>
           <a:prstGeom prst="rect">
             <a:avLst/>
@@ -14873,7 +14975,7 @@
               </a:schemeClr>
             </a:solidFill>
             <a:custDash>
-              <a:ds d="2200000" sp="800000"/>
+              <a:ds d="2900000" sp="1000000"/>
             </a:custDash>
             <a:round/>
           </a:ln>
@@ -14912,7 +15014,7 @@
               </a:schemeClr>
             </a:solidFill>
             <a:custDash>
-              <a:ds d="2200000" sp="800000"/>
+              <a:ds d="2900000" sp="1000000"/>
             </a:custDash>
             <a:round/>
           </a:ln>
@@ -14939,7 +15041,7 @@
         <p:spPr>
           <a:xfrm>
             <a:off x="2052000" y="4645440"/>
-            <a:ext cx="1026360" cy="398520"/>
+            <a:ext cx="1026000" cy="398160"/>
           </a:xfrm>
           <a:prstGeom prst="rect">
             <a:avLst/>
@@ -15039,7 +15141,7 @@
         <p:spPr>
           <a:xfrm>
             <a:off x="683640" y="297360"/>
-            <a:ext cx="8098200" cy="398520"/>
+            <a:ext cx="8097840" cy="398160"/>
           </a:xfrm>
           <a:prstGeom prst="rect">
             <a:avLst/>
@@ -15090,7 +15192,7 @@
         <p:spPr>
           <a:xfrm>
             <a:off x="201960" y="874800"/>
-            <a:ext cx="3362760" cy="2598480"/>
+            <a:ext cx="3362400" cy="2598120"/>
           </a:xfrm>
           <a:prstGeom prst="rect">
             <a:avLst/>
@@ -15109,7 +15211,7 @@
         <p:txBody>
           <a:bodyPr lIns="0" rIns="0" tIns="0" bIns="0"/>
           <a:p>
-            <a:pPr lvl="1" marL="270000" indent="-268200">
+            <a:pPr lvl="1" marL="270000" indent="-267840">
               <a:lnSpc>
                 <a:spcPct val="100000"/>
               </a:lnSpc>
@@ -15135,7 +15237,7 @@
             </a:endParaRPr>
           </a:p>
           <a:p>
-            <a:pPr lvl="1" marL="270000" indent="-268200">
+            <a:pPr lvl="1" marL="270000" indent="-267840">
               <a:lnSpc>
                 <a:spcPct val="100000"/>
               </a:lnSpc>
@@ -15161,7 +15263,7 @@
             </a:endParaRPr>
           </a:p>
           <a:p>
-            <a:pPr lvl="1" marL="270000" indent="-268200">
+            <a:pPr lvl="1" marL="270000" indent="-267840">
               <a:lnSpc>
                 <a:spcPct val="100000"/>
               </a:lnSpc>
@@ -15187,7 +15289,7 @@
             </a:endParaRPr>
           </a:p>
           <a:p>
-            <a:pPr lvl="1" marL="270000" indent="-268200">
+            <a:pPr lvl="1" marL="270000" indent="-267840">
               <a:lnSpc>
                 <a:spcPct val="100000"/>
               </a:lnSpc>
@@ -15246,7 +15348,7 @@
         <p:spPr>
           <a:xfrm>
             <a:off x="802440" y="4244400"/>
-            <a:ext cx="558000" cy="318960"/>
+            <a:ext cx="557640" cy="318600"/>
           </a:xfrm>
           <a:custGeom>
             <a:avLst/>
@@ -15318,7 +15420,7 @@
         <p:spPr>
           <a:xfrm>
             <a:off x="3566160" y="874800"/>
-            <a:ext cx="5475240" cy="2598480"/>
+            <a:ext cx="5474880" cy="2598120"/>
           </a:xfrm>
           <a:prstGeom prst="rect">
             <a:avLst/>
@@ -15337,7 +15439,7 @@
         <p:spPr>
           <a:xfrm>
             <a:off x="1389600" y="4221720"/>
-            <a:ext cx="6373800" cy="421560"/>
+            <a:ext cx="6373440" cy="421200"/>
           </a:xfrm>
           <a:prstGeom prst="rect">
             <a:avLst/>
@@ -15438,7 +15540,7 @@
         <p:spPr>
           <a:xfrm>
             <a:off x="159120" y="194760"/>
-            <a:ext cx="3411360" cy="398520"/>
+            <a:ext cx="3411000" cy="398160"/>
           </a:xfrm>
           <a:prstGeom prst="rect">
             <a:avLst/>
@@ -15493,7 +15595,7 @@
         <p:spPr>
           <a:xfrm>
             <a:off x="3670920" y="109800"/>
-            <a:ext cx="5393520" cy="4096800"/>
+            <a:ext cx="5393160" cy="4096440"/>
           </a:xfrm>
           <a:prstGeom prst="rect">
             <a:avLst/>
@@ -15519,7 +15621,7 @@
         <p:spPr>
           <a:xfrm>
             <a:off x="112680" y="1022760"/>
-            <a:ext cx="3492720" cy="2891520"/>
+            <a:ext cx="3492360" cy="2891160"/>
           </a:xfrm>
           <a:prstGeom prst="rect">
             <a:avLst/>
@@ -15538,7 +15640,7 @@
         <p:txBody>
           <a:bodyPr lIns="0" rIns="0" tIns="0" bIns="0"/>
           <a:p>
-            <a:pPr lvl="1" marL="270000" indent="-268200">
+            <a:pPr lvl="1" marL="270000" indent="-267840">
               <a:lnSpc>
                 <a:spcPct val="100000"/>
               </a:lnSpc>
@@ -15564,7 +15666,7 @@
             </a:endParaRPr>
           </a:p>
           <a:p>
-            <a:pPr lvl="1" marL="270000" indent="-268200">
+            <a:pPr lvl="1" marL="270000" indent="-267840">
               <a:lnSpc>
                 <a:spcPct val="100000"/>
               </a:lnSpc>
@@ -15590,7 +15692,7 @@
             </a:endParaRPr>
           </a:p>
           <a:p>
-            <a:pPr lvl="1" marL="270000" indent="-268200">
+            <a:pPr lvl="1" marL="270000" indent="-267840">
               <a:lnSpc>
                 <a:spcPct val="100000"/>
               </a:lnSpc>
@@ -15616,7 +15718,7 @@
             </a:endParaRPr>
           </a:p>
           <a:p>
-            <a:pPr lvl="1" marL="270000" indent="-268200">
+            <a:pPr lvl="1" marL="270000" indent="-267840">
               <a:lnSpc>
                 <a:spcPct val="100000"/>
               </a:lnSpc>
@@ -15652,7 +15754,7 @@
             </a:endParaRPr>
           </a:p>
           <a:p>
-            <a:pPr lvl="1" marL="270000" indent="-268200">
+            <a:pPr lvl="1" marL="270000" indent="-267840">
               <a:lnSpc>
                 <a:spcPct val="100000"/>
               </a:lnSpc>
@@ -15688,9 +15790,9 @@
         <p:grpSpPr>
           <a:xfrm>
             <a:off x="443160" y="4481280"/>
-            <a:ext cx="6962400" cy="1145160"/>
+            <a:ext cx="6962040" cy="1144800"/>
             <a:chOff x="443160" y="4481280"/>
-            <a:chExt cx="6962400" cy="1145160"/>
+            <a:chExt cx="6962040" cy="1144800"/>
           </a:xfrm>
         </p:grpSpPr>
         <p:sp>
@@ -15702,7 +15804,7 @@
           <p:spPr>
             <a:xfrm>
               <a:off x="443160" y="4510080"/>
-              <a:ext cx="591480" cy="318960"/>
+              <a:ext cx="591120" cy="318600"/>
             </a:xfrm>
             <a:custGeom>
               <a:avLst/>
@@ -15770,7 +15872,7 @@
           <p:spPr>
             <a:xfrm>
               <a:off x="1080360" y="4481280"/>
-              <a:ext cx="6325200" cy="1145160"/>
+              <a:ext cx="6324840" cy="1144800"/>
             </a:xfrm>
             <a:prstGeom prst="rect">
               <a:avLst/>
@@ -15973,7 +16075,7 @@
         <p:spPr>
           <a:xfrm>
             <a:off x="683640" y="297360"/>
-            <a:ext cx="8098200" cy="398520"/>
+            <a:ext cx="8097840" cy="398160"/>
           </a:xfrm>
           <a:prstGeom prst="rect">
             <a:avLst/>
@@ -16024,7 +16126,7 @@
         <p:spPr>
           <a:xfrm>
             <a:off x="591840" y="1785600"/>
-            <a:ext cx="4635360" cy="2740320"/>
+            <a:ext cx="4635000" cy="2739960"/>
           </a:xfrm>
           <a:prstGeom prst="rect">
             <a:avLst/>
@@ -16043,7 +16145,7 @@
         <p:txBody>
           <a:bodyPr lIns="0" rIns="0" tIns="0" bIns="0"/>
           <a:p>
-            <a:pPr lvl="1" marL="270000" indent="-268200">
+            <a:pPr lvl="1" marL="270000" indent="-267840">
               <a:lnSpc>
                 <a:spcPct val="100000"/>
               </a:lnSpc>
@@ -16069,7 +16171,7 @@
             </a:endParaRPr>
           </a:p>
           <a:p>
-            <a:pPr lvl="2" marL="743400" indent="-284400">
+            <a:pPr lvl="2" marL="743400" indent="-284040">
               <a:lnSpc>
                 <a:spcPct val="100000"/>
               </a:lnSpc>
@@ -16097,7 +16199,7 @@
             </a:endParaRPr>
           </a:p>
           <a:p>
-            <a:pPr lvl="2" marL="743400" indent="-284400">
+            <a:pPr lvl="2" marL="743400" indent="-284040">
               <a:lnSpc>
                 <a:spcPct val="100000"/>
               </a:lnSpc>
@@ -16122,7 +16224,7 @@
             </a:endParaRPr>
           </a:p>
           <a:p>
-            <a:pPr lvl="1" marL="270000" indent="-268200">
+            <a:pPr lvl="1" marL="270000" indent="-267840">
               <a:lnSpc>
                 <a:spcPct val="100000"/>
               </a:lnSpc>
@@ -16148,7 +16250,7 @@
             </a:endParaRPr>
           </a:p>
           <a:p>
-            <a:pPr lvl="1" marL="270000" indent="-268200">
+            <a:pPr lvl="1" marL="270000" indent="-267840">
               <a:lnSpc>
                 <a:spcPct val="100000"/>
               </a:lnSpc>
@@ -16174,7 +16276,7 @@
             </a:endParaRPr>
           </a:p>
           <a:p>
-            <a:pPr lvl="1" marL="270000" indent="-268200">
+            <a:pPr lvl="1" marL="270000" indent="-267840">
               <a:lnSpc>
                 <a:spcPct val="100000"/>
               </a:lnSpc>
@@ -16223,7 +16325,7 @@
         <p:spPr>
           <a:xfrm>
             <a:off x="91440" y="5115240"/>
-            <a:ext cx="8674560" cy="380160"/>
+            <a:ext cx="8674200" cy="379800"/>
           </a:xfrm>
           <a:prstGeom prst="rect">
             <a:avLst/>
@@ -16276,7 +16378,7 @@
         <p:spPr>
           <a:xfrm>
             <a:off x="5638320" y="1075320"/>
-            <a:ext cx="2937600" cy="3636000"/>
+            <a:ext cx="2937240" cy="3635640"/>
           </a:xfrm>
           <a:prstGeom prst="rect">
             <a:avLst/>
@@ -16302,7 +16404,7 @@
         <p:spPr>
           <a:xfrm>
             <a:off x="434160" y="1155960"/>
-            <a:ext cx="4285440" cy="698400"/>
+            <a:ext cx="4285080" cy="698040"/>
           </a:xfrm>
           <a:prstGeom prst="rect">
             <a:avLst/>
@@ -16406,7 +16508,7 @@
         <p:spPr>
           <a:xfrm>
             <a:off x="683640" y="297360"/>
-            <a:ext cx="8098200" cy="398520"/>
+            <a:ext cx="8097840" cy="398160"/>
           </a:xfrm>
           <a:prstGeom prst="rect">
             <a:avLst/>
@@ -16457,7 +16559,7 @@
         <p:spPr>
           <a:xfrm>
             <a:off x="256320" y="1073880"/>
-            <a:ext cx="8638560" cy="3384360"/>
+            <a:ext cx="8638200" cy="3384000"/>
           </a:xfrm>
           <a:prstGeom prst="rect">
             <a:avLst/>
@@ -16476,7 +16578,7 @@
         <p:txBody>
           <a:bodyPr lIns="0" rIns="0" tIns="0" bIns="0"/>
           <a:p>
-            <a:pPr lvl="1" marL="270000" indent="-268200">
+            <a:pPr lvl="1" marL="270000" indent="-267840">
               <a:lnSpc>
                 <a:spcPct val="100000"/>
               </a:lnSpc>
@@ -16502,7 +16604,7 @@
             </a:endParaRPr>
           </a:p>
           <a:p>
-            <a:pPr lvl="1" marL="270000" indent="-268200">
+            <a:pPr lvl="1" marL="270000" indent="-267840">
               <a:lnSpc>
                 <a:spcPct val="100000"/>
               </a:lnSpc>
@@ -16528,7 +16630,7 @@
             </a:endParaRPr>
           </a:p>
           <a:p>
-            <a:pPr lvl="1" marL="270000" indent="-268200">
+            <a:pPr lvl="1" marL="270000" indent="-267840">
               <a:lnSpc>
                 <a:spcPct val="100000"/>
               </a:lnSpc>
@@ -16554,7 +16656,7 @@
             </a:endParaRPr>
           </a:p>
           <a:p>
-            <a:pPr lvl="2" marL="1296000" indent="-286560">
+            <a:pPr lvl="2" marL="1296000" indent="-286200">
               <a:lnSpc>
                 <a:spcPct val="100000"/>
               </a:lnSpc>
@@ -16583,7 +16685,7 @@
             </a:endParaRPr>
           </a:p>
           <a:p>
-            <a:pPr lvl="2" marL="1296000" indent="-286560">
+            <a:pPr lvl="2" marL="1296000" indent="-286200">
               <a:lnSpc>
                 <a:spcPct val="100000"/>
               </a:lnSpc>
@@ -16632,7 +16734,7 @@
             </a:endParaRPr>
           </a:p>
           <a:p>
-            <a:pPr lvl="2" marL="1296000" indent="-286560">
+            <a:pPr lvl="2" marL="1296000" indent="-286200">
               <a:lnSpc>
                 <a:spcPct val="100000"/>
               </a:lnSpc>
@@ -16661,7 +16763,7 @@
             </a:endParaRPr>
           </a:p>
           <a:p>
-            <a:pPr lvl="2" marL="1296000" indent="-286560">
+            <a:pPr lvl="2" marL="1296000" indent="-286200">
               <a:lnSpc>
                 <a:spcPct val="100000"/>
               </a:lnSpc>
@@ -16690,7 +16792,7 @@
             </a:endParaRPr>
           </a:p>
           <a:p>
-            <a:pPr lvl="2" marL="1296000" indent="-286560">
+            <a:pPr lvl="2" marL="1296000" indent="-286200">
               <a:lnSpc>
                 <a:spcPct val="100000"/>
               </a:lnSpc>
@@ -16955,7 +17057,7 @@
         <p:spPr>
           <a:xfrm>
             <a:off x="2188080" y="2511360"/>
-            <a:ext cx="5758200" cy="598320"/>
+            <a:ext cx="5757840" cy="597960"/>
           </a:xfrm>
           <a:prstGeom prst="rect">
             <a:avLst/>
@@ -17007,7 +17109,7 @@
         <p:spPr>
           <a:xfrm>
             <a:off x="2188080" y="3261240"/>
-            <a:ext cx="5758200" cy="598320"/>
+            <a:ext cx="5757840" cy="597960"/>
           </a:xfrm>
           <a:prstGeom prst="rect">
             <a:avLst/>
@@ -17059,7 +17161,7 @@
         <p:spPr>
           <a:xfrm>
             <a:off x="2188080" y="4009680"/>
-            <a:ext cx="5758200" cy="598320"/>
+            <a:ext cx="5757840" cy="597960"/>
           </a:xfrm>
           <a:prstGeom prst="rect">
             <a:avLst/>
@@ -17111,7 +17213,7 @@
         <p:spPr>
           <a:xfrm>
             <a:off x="2188080" y="1761120"/>
-            <a:ext cx="5758200" cy="598320"/>
+            <a:ext cx="5757840" cy="597960"/>
           </a:xfrm>
           <a:prstGeom prst="rect">
             <a:avLst/>
@@ -17163,7 +17265,7 @@
         <p:spPr>
           <a:xfrm>
             <a:off x="1115640" y="1800000"/>
-            <a:ext cx="601560" cy="478080"/>
+            <a:ext cx="601200" cy="477720"/>
           </a:xfrm>
           <a:prstGeom prst="roundRect">
             <a:avLst>
@@ -17232,7 +17334,7 @@
         <p:spPr>
           <a:xfrm>
             <a:off x="1115640" y="2549880"/>
-            <a:ext cx="601560" cy="478080"/>
+            <a:ext cx="601200" cy="477720"/>
           </a:xfrm>
           <a:prstGeom prst="roundRect">
             <a:avLst>
@@ -17301,7 +17403,7 @@
         <p:spPr>
           <a:xfrm>
             <a:off x="1115640" y="3300120"/>
-            <a:ext cx="601560" cy="478080"/>
+            <a:ext cx="601200" cy="477720"/>
           </a:xfrm>
           <a:prstGeom prst="roundRect">
             <a:avLst>
@@ -17370,7 +17472,7 @@
         <p:spPr>
           <a:xfrm>
             <a:off x="1115640" y="4050000"/>
-            <a:ext cx="601560" cy="478080"/>
+            <a:ext cx="601200" cy="477720"/>
           </a:xfrm>
           <a:prstGeom prst="roundRect">
             <a:avLst>
@@ -17439,7 +17541,7 @@
         <p:spPr>
           <a:xfrm>
             <a:off x="539640" y="0"/>
-            <a:ext cx="6073200" cy="718200"/>
+            <a:ext cx="6072840" cy="717840"/>
           </a:xfrm>
           <a:prstGeom prst="rect">
             <a:avLst/>
@@ -17540,7 +17642,7 @@
         <p:spPr>
           <a:xfrm>
             <a:off x="683640" y="311040"/>
-            <a:ext cx="8098200" cy="398520"/>
+            <a:ext cx="8097840" cy="398160"/>
           </a:xfrm>
           <a:prstGeom prst="rect">
             <a:avLst/>
@@ -17589,7 +17691,7 @@
         <p:spPr>
           <a:xfrm>
             <a:off x="366120" y="1995480"/>
-            <a:ext cx="8638560" cy="3540600"/>
+            <a:ext cx="8638200" cy="3540240"/>
           </a:xfrm>
           <a:prstGeom prst="rect">
             <a:avLst/>
@@ -17608,7 +17710,7 @@
         <p:txBody>
           <a:bodyPr lIns="0" rIns="0" tIns="0" bIns="0"/>
           <a:p>
-            <a:pPr lvl="1" marL="270000" indent="-268200">
+            <a:pPr lvl="1" marL="270000" indent="-267840">
               <a:lnSpc>
                 <a:spcPct val="100000"/>
               </a:lnSpc>
@@ -17644,7 +17746,7 @@
             </a:endParaRPr>
           </a:p>
           <a:p>
-            <a:pPr lvl="2" marL="1296000" indent="-286560">
+            <a:pPr lvl="2" marL="1296000" indent="-286200">
               <a:lnSpc>
                 <a:spcPct val="100000"/>
               </a:lnSpc>
@@ -17673,7 +17775,7 @@
             </a:endParaRPr>
           </a:p>
           <a:p>
-            <a:pPr lvl="2" marL="1296000" indent="-286560">
+            <a:pPr lvl="2" marL="1296000" indent="-286200">
               <a:lnSpc>
                 <a:spcPct val="100000"/>
               </a:lnSpc>
@@ -17702,7 +17804,7 @@
             </a:endParaRPr>
           </a:p>
           <a:p>
-            <a:pPr lvl="1" marL="270000" indent="-268200">
+            <a:pPr lvl="1" marL="270000" indent="-267840">
               <a:lnSpc>
                 <a:spcPct val="100000"/>
               </a:lnSpc>
@@ -17738,7 +17840,7 @@
             </a:endParaRPr>
           </a:p>
           <a:p>
-            <a:pPr lvl="2" marL="1296000" indent="-286560">
+            <a:pPr lvl="2" marL="1296000" indent="-286200">
               <a:lnSpc>
                 <a:spcPct val="100000"/>
               </a:lnSpc>
@@ -17767,7 +17869,7 @@
             </a:endParaRPr>
           </a:p>
           <a:p>
-            <a:pPr lvl="2" marL="1296000" indent="-286560">
+            <a:pPr lvl="2" marL="1296000" indent="-286200">
               <a:lnSpc>
                 <a:spcPct val="100000"/>
               </a:lnSpc>
@@ -17796,7 +17898,7 @@
             </a:endParaRPr>
           </a:p>
           <a:p>
-            <a:pPr lvl="1" marL="270000" indent="-268200">
+            <a:pPr lvl="1" marL="270000" indent="-267840">
               <a:lnSpc>
                 <a:spcPct val="100000"/>
               </a:lnSpc>
@@ -17832,7 +17934,7 @@
             </a:endParaRPr>
           </a:p>
           <a:p>
-            <a:pPr lvl="2" marL="1296000" indent="-286560">
+            <a:pPr lvl="2" marL="1296000" indent="-286200">
               <a:lnSpc>
                 <a:spcPct val="100000"/>
               </a:lnSpc>
@@ -17861,7 +17963,7 @@
             </a:endParaRPr>
           </a:p>
           <a:p>
-            <a:pPr lvl="2" marL="1296000" indent="-286560">
+            <a:pPr lvl="2" marL="1296000" indent="-286200">
               <a:lnSpc>
                 <a:spcPct val="100000"/>
               </a:lnSpc>
@@ -17940,7 +18042,7 @@
         <p:spPr>
           <a:xfrm>
             <a:off x="182880" y="914400"/>
-            <a:ext cx="8685360" cy="713880"/>
+            <a:ext cx="8685000" cy="713520"/>
           </a:xfrm>
           <a:prstGeom prst="rect">
             <a:avLst/>
@@ -18565,7 +18667,7 @@
         <p:spPr>
           <a:xfrm>
             <a:off x="683640" y="297360"/>
-            <a:ext cx="8098200" cy="398520"/>
+            <a:ext cx="8097840" cy="398160"/>
           </a:xfrm>
           <a:prstGeom prst="rect">
             <a:avLst/>
@@ -18616,7 +18718,7 @@
         <p:spPr>
           <a:xfrm>
             <a:off x="528480" y="1152000"/>
-            <a:ext cx="8202240" cy="3709800"/>
+            <a:ext cx="8201880" cy="3709440"/>
           </a:xfrm>
           <a:prstGeom prst="rect">
             <a:avLst/>
@@ -18635,7 +18737,7 @@
         <p:txBody>
           <a:bodyPr lIns="0" rIns="0" tIns="0" bIns="0"/>
           <a:p>
-            <a:pPr lvl="1" marL="270000" indent="-268200">
+            <a:pPr lvl="1" marL="270000" indent="-267840">
               <a:lnSpc>
                 <a:spcPct val="100000"/>
               </a:lnSpc>
@@ -18671,7 +18773,7 @@
             </a:endParaRPr>
           </a:p>
           <a:p>
-            <a:pPr lvl="2" marL="727200" indent="-268200">
+            <a:pPr lvl="2" marL="727200" indent="-267840">
               <a:lnSpc>
                 <a:spcPct val="100000"/>
               </a:lnSpc>
@@ -18697,7 +18799,7 @@
             </a:endParaRPr>
           </a:p>
           <a:p>
-            <a:pPr lvl="1" marL="270000" indent="-268200">
+            <a:pPr lvl="1" marL="270000" indent="-267840">
               <a:lnSpc>
                 <a:spcPct val="100000"/>
               </a:lnSpc>
@@ -18733,7 +18835,7 @@
             </a:endParaRPr>
           </a:p>
           <a:p>
-            <a:pPr lvl="1" marL="270000" indent="-268200">
+            <a:pPr lvl="1" marL="270000" indent="-267840">
               <a:lnSpc>
                 <a:spcPct val="100000"/>
               </a:lnSpc>
@@ -18779,7 +18881,7 @@
             </a:endParaRPr>
           </a:p>
           <a:p>
-            <a:pPr lvl="1" marL="270000" indent="-268200">
+            <a:pPr lvl="1" marL="270000" indent="-267840">
               <a:lnSpc>
                 <a:spcPct val="100000"/>
               </a:lnSpc>
@@ -18838,7 +18940,7 @@
             </a:endParaRPr>
           </a:p>
           <a:p>
-            <a:pPr lvl="1" marL="270000" indent="-268200">
+            <a:pPr lvl="1" marL="270000" indent="-267840">
               <a:lnSpc>
                 <a:spcPct val="100000"/>
               </a:lnSpc>
@@ -18867,7 +18969,7 @@
                 <a:latin typeface="Arial"/>
                 <a:ea typeface="DejaVu Sans"/>
               </a:rPr>
-              <a:t> : 3.8 </a:t>
+              <a:t> : 3.10 </a:t>
             </a:r>
             <a:r>
               <a:rPr b="0" lang="en-US" sz="1300" spc="-1" strike="noStrike">
@@ -18877,7 +18979,7 @@
                 <a:latin typeface="Arial"/>
                 <a:ea typeface="DejaVu Sans"/>
               </a:rPr>
-              <a:t>(as of February 2020)</a:t>
+              <a:t>(as of February 2022)</a:t>
             </a:r>
             <a:endParaRPr b="0" lang="en-US" sz="1300" spc="-1" strike="noStrike">
               <a:latin typeface="Arial"/>
@@ -18942,7 +19044,7 @@
         <p:spPr>
           <a:xfrm>
             <a:off x="4932000" y="4401000"/>
-            <a:ext cx="3924360" cy="1018440"/>
+            <a:ext cx="3924000" cy="1018080"/>
           </a:xfrm>
           <a:prstGeom prst="rect">
             <a:avLst/>
@@ -19013,7 +19115,7 @@
         <p:spPr>
           <a:xfrm>
             <a:off x="683640" y="297360"/>
-            <a:ext cx="8098200" cy="398520"/>
+            <a:ext cx="8097840" cy="398160"/>
           </a:xfrm>
           <a:prstGeom prst="rect">
             <a:avLst/>
@@ -19068,7 +19170,7 @@
         <p:spPr>
           <a:xfrm>
             <a:off x="451440" y="914400"/>
-            <a:ext cx="7412040" cy="4818240"/>
+            <a:ext cx="7411680" cy="4817880"/>
           </a:xfrm>
           <a:prstGeom prst="rect">
             <a:avLst/>
@@ -19087,7 +19189,7 @@
         <p:spPr>
           <a:xfrm>
             <a:off x="4682880" y="5447520"/>
-            <a:ext cx="4936320" cy="244440"/>
+            <a:ext cx="4935960" cy="244080"/>
           </a:xfrm>
           <a:prstGeom prst="rect">
             <a:avLst/>
@@ -19188,7 +19290,7 @@
         <p:spPr>
           <a:xfrm>
             <a:off x="683640" y="297360"/>
-            <a:ext cx="8098200" cy="398520"/>
+            <a:ext cx="8097840" cy="398160"/>
           </a:xfrm>
           <a:prstGeom prst="rect">
             <a:avLst/>
@@ -19239,7 +19341,7 @@
         <p:spPr>
           <a:xfrm>
             <a:off x="6035040" y="5446080"/>
-            <a:ext cx="3107520" cy="236880"/>
+            <a:ext cx="3107160" cy="236520"/>
           </a:xfrm>
           <a:prstGeom prst="rect">
             <a:avLst/>
@@ -19292,7 +19394,7 @@
         <p:spPr>
           <a:xfrm>
             <a:off x="116640" y="1474200"/>
-            <a:ext cx="9019440" cy="3237840"/>
+            <a:ext cx="9019080" cy="3237480"/>
           </a:xfrm>
           <a:prstGeom prst="rect">
             <a:avLst/>
@@ -19363,7 +19465,7 @@
         <p:spPr>
           <a:xfrm>
             <a:off x="683640" y="297360"/>
-            <a:ext cx="8098200" cy="398520"/>
+            <a:ext cx="8097840" cy="398160"/>
           </a:xfrm>
           <a:prstGeom prst="rect">
             <a:avLst/>
@@ -19414,7 +19516,7 @@
         <p:spPr>
           <a:xfrm>
             <a:off x="508320" y="1948680"/>
-            <a:ext cx="6946200" cy="2571840"/>
+            <a:ext cx="6945840" cy="2571480"/>
           </a:xfrm>
           <a:prstGeom prst="rect">
             <a:avLst/>
@@ -19433,7 +19535,7 @@
         <p:txBody>
           <a:bodyPr lIns="0" rIns="0" tIns="0" bIns="0"/>
           <a:p>
-            <a:pPr lvl="1" marL="270000" indent="-268200">
+            <a:pPr lvl="1" marL="270000" indent="-267840">
               <a:lnSpc>
                 <a:spcPct val="100000"/>
               </a:lnSpc>
@@ -19459,7 +19561,7 @@
             </a:endParaRPr>
           </a:p>
           <a:p>
-            <a:pPr lvl="1" marL="270000" indent="-268200">
+            <a:pPr lvl="1" marL="270000" indent="-267840">
               <a:lnSpc>
                 <a:spcPct val="100000"/>
               </a:lnSpc>
@@ -19485,7 +19587,7 @@
             </a:endParaRPr>
           </a:p>
           <a:p>
-            <a:pPr lvl="1" marL="270000" indent="-268200">
+            <a:pPr lvl="1" marL="270000" indent="-267840">
               <a:lnSpc>
                 <a:spcPct val="100000"/>
               </a:lnSpc>
@@ -19511,7 +19613,7 @@
             </a:endParaRPr>
           </a:p>
           <a:p>
-            <a:pPr lvl="1" marL="270000" indent="-268200">
+            <a:pPr lvl="1" marL="270000" indent="-267840">
               <a:lnSpc>
                 <a:spcPct val="100000"/>
               </a:lnSpc>
@@ -19537,7 +19639,7 @@
             </a:endParaRPr>
           </a:p>
           <a:p>
-            <a:pPr lvl="2" marL="809640" indent="-179640">
+            <a:pPr lvl="2" marL="809640" indent="-179280">
               <a:lnSpc>
                 <a:spcPct val="100000"/>
               </a:lnSpc>
@@ -19566,7 +19668,7 @@
             </a:endParaRPr>
           </a:p>
           <a:p>
-            <a:pPr lvl="2" marL="809640" indent="-179640">
+            <a:pPr lvl="2" marL="809640" indent="-179280">
               <a:lnSpc>
                 <a:spcPct val="100000"/>
               </a:lnSpc>
@@ -19635,7 +19737,7 @@
         <p:spPr>
           <a:xfrm>
             <a:off x="182880" y="914760"/>
-            <a:ext cx="8685360" cy="713880"/>
+            <a:ext cx="8685000" cy="713520"/>
           </a:xfrm>
           <a:prstGeom prst="rect">
             <a:avLst/>
@@ -19729,7 +19831,7 @@
         <p:spPr>
           <a:xfrm>
             <a:off x="5265360" y="4683600"/>
-            <a:ext cx="3591000" cy="931680"/>
+            <a:ext cx="3590640" cy="931320"/>
           </a:xfrm>
           <a:prstGeom prst="rect">
             <a:avLst/>

</xml_diff>